<commit_message>
Prototype 22565 login + logout + home Prototype 22566 Update user info Prototype 22567 Search user by username/firstname/lastname Prototype 22568 Change password Prototype 22569 List all posts
</commit_message>
<xml_diff>
--- a/doc/frontend/wireframe/TRN-MiniBlog_WireframeDesign_UayLe.pptx
+++ b/doc/frontend/wireframe/TRN-MiniBlog_WireframeDesign_UayLe.pptx
@@ -122,7 +122,7 @@
   </p:defaultTextStyle>
   <p:extLst>
     <p:ext uri="{EFAFB233-063F-42B5-8137-9DF3F51BA10A}">
-      <p15:sldGuideLst xmlns="" xmlns:p15="http://schemas.microsoft.com/office/powerpoint/2012/main">
+      <p15:sldGuideLst xmlns:p15="http://schemas.microsoft.com/office/powerpoint/2012/main" xmlns="">
         <p15:guide id="1" orient="horz" pos="2160">
           <p15:clr>
             <a:srgbClr val="A4A3A4"/>
@@ -220,7 +220,7 @@
           </a:lstStyle>
           <a:p>
             <a:fld id="{0B14D75D-3A88-044C-B530-B9A2A8B351DB}" type="datetimeFigureOut">
-              <a:t>2/27/15</a:t>
+              <a:t>3/2/15</a:t>
             </a:fld>
             <a:endParaRPr kumimoji="1" lang="ja-JP" altLang="en-US"/>
           </a:p>
@@ -677,7 +677,7 @@
                 <a:ea typeface="ＭＳ Ｐゴシック"/>
               </a:rPr>
               <a:pPr/>
-              <a:t>2/27/15</a:t>
+              <a:t>3/2/15</a:t>
             </a:fld>
             <a:endParaRPr lang="ja-JP" altLang="en-US">
               <a:solidFill>
@@ -921,7 +921,7 @@
                 <a:ea typeface="ＭＳ Ｐゴシック"/>
               </a:rPr>
               <a:pPr/>
-              <a:t>2/27/15</a:t>
+              <a:t>3/2/15</a:t>
             </a:fld>
             <a:endParaRPr lang="ja-JP" altLang="en-US">
               <a:solidFill>
@@ -1175,7 +1175,7 @@
                 <a:ea typeface="ＭＳ Ｐゴシック"/>
               </a:rPr>
               <a:pPr/>
-              <a:t>2/27/15</a:t>
+              <a:t>3/2/15</a:t>
             </a:fld>
             <a:endParaRPr lang="ja-JP" altLang="en-US">
               <a:solidFill>
@@ -1312,7 +1312,7 @@
                 <a:ea typeface="ＭＳ Ｐゴシック"/>
               </a:rPr>
               <a:pPr/>
-              <a:t>2/27/15</a:t>
+              <a:t>3/2/15</a:t>
             </a:fld>
             <a:endParaRPr lang="ja-JP" altLang="en-US">
               <a:solidFill>
@@ -1983,7 +1983,7 @@
                 <a:ea typeface="ＭＳ Ｐゴシック"/>
               </a:rPr>
               <a:pPr/>
-              <a:t>2/27/15</a:t>
+              <a:t>3/2/15</a:t>
             </a:fld>
             <a:endParaRPr lang="ja-JP" altLang="en-US">
               <a:solidFill>
@@ -2654,7 +2654,7 @@
                 <a:ea typeface="ＭＳ Ｐゴシック"/>
               </a:rPr>
               <a:pPr/>
-              <a:t>2/27/15</a:t>
+              <a:t>3/2/15</a:t>
             </a:fld>
             <a:endParaRPr lang="ja-JP" altLang="en-US">
               <a:solidFill>
@@ -3432,7 +3432,7 @@
                 <a:ea typeface="ＭＳ Ｐゴシック"/>
               </a:rPr>
               <a:pPr/>
-              <a:t>2/27/15</a:t>
+              <a:t>3/2/15</a:t>
             </a:fld>
             <a:endParaRPr lang="ja-JP" altLang="en-US">
               <a:solidFill>
@@ -3970,7 +3970,7 @@
                 <a:ea typeface="ＭＳ Ｐゴシック"/>
               </a:rPr>
               <a:pPr/>
-              <a:t>2/27/15</a:t>
+              <a:t>3/2/15</a:t>
             </a:fld>
             <a:endParaRPr lang="ja-JP" altLang="en-US">
               <a:solidFill>
@@ -4364,7 +4364,7 @@
                 <a:ea typeface="ＭＳ Ｐゴシック"/>
               </a:rPr>
               <a:pPr/>
-              <a:t>2/27/15</a:t>
+              <a:t>3/2/15</a:t>
             </a:fld>
             <a:endParaRPr lang="ja-JP" altLang="en-US">
               <a:solidFill>
@@ -5255,7 +5255,7 @@
                 <a:ea typeface="ＭＳ Ｐゴシック"/>
               </a:rPr>
               <a:pPr/>
-              <a:t>2/27/15</a:t>
+              <a:t>3/2/15</a:t>
             </a:fld>
             <a:endParaRPr lang="ja-JP" altLang="en-US">
               <a:solidFill>
@@ -5415,7 +5415,7 @@
                 <a:ea typeface="ＭＳ Ｐゴシック"/>
               </a:rPr>
               <a:pPr/>
-              <a:t>2/27/15</a:t>
+              <a:t>3/2/15</a:t>
             </a:fld>
             <a:endParaRPr lang="ja-JP" altLang="en-US">
               <a:solidFill>
@@ -5552,7 +5552,7 @@
                 <a:ea typeface="ＭＳ Ｐゴシック"/>
               </a:rPr>
               <a:pPr/>
-              <a:t>2/27/15</a:t>
+              <a:t>3/2/15</a:t>
             </a:fld>
             <a:endParaRPr lang="ja-JP" altLang="en-US">
               <a:solidFill>
@@ -5903,7 +5903,7 @@
                 <a:ea typeface="ＭＳ Ｐゴシック"/>
               </a:rPr>
               <a:pPr/>
-              <a:t>2/27/15</a:t>
+              <a:t>3/2/15</a:t>
             </a:fld>
             <a:endParaRPr lang="ja-JP" altLang="en-US">
               <a:solidFill>
@@ -6198,7 +6198,7 @@
                 <a:ea typeface="ＭＳ Ｐゴシック"/>
               </a:rPr>
               <a:pPr/>
-              <a:t>2/27/15</a:t>
+              <a:t>3/2/15</a:t>
             </a:fld>
             <a:endParaRPr lang="ja-JP" altLang="en-US">
               <a:solidFill>
@@ -6485,7 +6485,7 @@
                 <a:ea typeface="ＭＳ Ｐゴシック"/>
               </a:rPr>
               <a:pPr/>
-              <a:t>2/27/15</a:t>
+              <a:t>3/2/15</a:t>
             </a:fld>
             <a:endParaRPr kumimoji="1" lang="ja-JP" altLang="en-US">
               <a:solidFill>
@@ -8736,19 +8736,11 @@
             <a:pPr algn="r"/>
             <a:r>
               <a:rPr kumimoji="1" lang="en-US" altLang="ja-JP" sz="1000" dirty="0"/>
-              <a:t> </a:t>
-            </a:r>
-            <a:r>
-              <a:rPr kumimoji="1" lang="en-US" altLang="ja-JP" sz="1000" dirty="0"/>
-              <a:t>Main Page| My Blog | New Post </a:t>
+              <a:t> Main Page| My Blog | New Post </a:t>
             </a:r>
             <a:r>
               <a:rPr kumimoji="1" lang="en-US" altLang="ja-JP" sz="1000" dirty="0" smtClean="0"/>
-              <a:t>                                        </a:t>
-            </a:r>
-            <a:r>
-              <a:rPr kumimoji="1" lang="en-US" altLang="ja-JP" sz="1000" dirty="0" smtClean="0"/>
-              <a:t>Uay Le U| Logout</a:t>
+              <a:t>                                        Uay Le U| Logout</a:t>
             </a:r>
             <a:endParaRPr kumimoji="1" lang="ja-JP" altLang="en-US" sz="1000" dirty="0">
               <a:solidFill>
@@ -8933,14 +8925,14 @@
           <p:nvPr>
             <p:extLst>
               <p:ext uri="{D42A27DB-BD31-4B8C-83A1-F6EECF244321}">
-                <p14:modId xmlns:p14="http://schemas.microsoft.com/office/powerpoint/2010/main" val="3724545637"/>
+                <p14:modId xmlns:p14="http://schemas.microsoft.com/office/powerpoint/2010/main" val="291193980"/>
               </p:ext>
             </p:extLst>
           </p:nvPr>
         </p:nvGraphicFramePr>
         <p:xfrm>
-          <a:off x="876992" y="2168564"/>
-          <a:ext cx="3600570" cy="1794872"/>
+          <a:off x="1165405" y="2152844"/>
+          <a:ext cx="3042242" cy="1794872"/>
         </p:xfrm>
         <a:graphic>
           <a:graphicData uri="http://schemas.openxmlformats.org/drawingml/2006/table">
@@ -8953,7 +8945,6 @@
                 <a:gridCol w="720114"/>
                 <a:gridCol w="720114"/>
                 <a:gridCol w="881900"/>
-                <a:gridCol w="558328"/>
               </a:tblGrid>
               <a:tr h="448718">
                 <a:tc>
@@ -9020,20 +9011,6 @@
                   </a:txBody>
                   <a:tcPr/>
                 </a:tc>
-                <a:tc>
-                  <a:txBody>
-                    <a:bodyPr/>
-                    <a:lstStyle/>
-                    <a:p>
-                      <a:r>
-                        <a:rPr lang="en-US" sz="1000" dirty="0" smtClean="0"/>
-                        <a:t>Status</a:t>
-                      </a:r>
-                      <a:endParaRPr lang="en-US" sz="1000" dirty="0"/>
-                    </a:p>
-                  </a:txBody>
-                  <a:tcPr/>
-                </a:tc>
               </a:tr>
               <a:tr h="448718">
                 <a:tc>
@@ -9090,20 +9067,6 @@
                       <a:r>
                         <a:rPr lang="en-US" sz="1000" dirty="0" err="1" smtClean="0"/>
                         <a:t>le.uay@mulodo.com</a:t>
-                      </a:r>
-                      <a:endParaRPr lang="en-US" sz="1000" dirty="0"/>
-                    </a:p>
-                  </a:txBody>
-                  <a:tcPr/>
-                </a:tc>
-                <a:tc>
-                  <a:txBody>
-                    <a:bodyPr/>
-                    <a:lstStyle/>
-                    <a:p>
-                      <a:r>
-                        <a:rPr lang="en-US" sz="1000" dirty="0" smtClean="0"/>
-                        <a:t>Active</a:t>
                       </a:r>
                       <a:endParaRPr lang="en-US" sz="1000" dirty="0"/>
                     </a:p>
@@ -9170,20 +9133,6 @@
                   </a:txBody>
                   <a:tcPr/>
                 </a:tc>
-                <a:tc>
-                  <a:txBody>
-                    <a:bodyPr/>
-                    <a:lstStyle/>
-                    <a:p>
-                      <a:r>
-                        <a:rPr lang="en-US" sz="1000" dirty="0" smtClean="0"/>
-                        <a:t>Active</a:t>
-                      </a:r>
-                      <a:endParaRPr lang="en-US" sz="1000" dirty="0"/>
-                    </a:p>
-                  </a:txBody>
-                  <a:tcPr/>
-                </a:tc>
               </a:tr>
               <a:tr h="448718">
                 <a:tc>
@@ -9236,20 +9185,6 @@
                       <a:r>
                         <a:rPr lang="en-US" sz="1000" dirty="0" err="1" smtClean="0"/>
                         <a:t>le.huy@mulodo.com</a:t>
-                      </a:r>
-                      <a:endParaRPr lang="en-US" sz="1000" dirty="0"/>
-                    </a:p>
-                  </a:txBody>
-                  <a:tcPr/>
-                </a:tc>
-                <a:tc>
-                  <a:txBody>
-                    <a:bodyPr/>
-                    <a:lstStyle/>
-                    <a:p>
-                      <a:r>
-                        <a:rPr lang="en-US" sz="1000" dirty="0" smtClean="0"/>
-                        <a:t>Active</a:t>
                       </a:r>
                       <a:endParaRPr lang="en-US" sz="1000" dirty="0"/>
                     </a:p>
@@ -9432,11 +9367,7 @@
             </a:r>
             <a:r>
               <a:rPr kumimoji="1" lang="en-US" altLang="ja-JP" dirty="0" smtClean="0"/>
-              <a:t>-2</a:t>
-            </a:r>
-            <a:r>
-              <a:rPr kumimoji="1" lang="en-US" altLang="ja-JP" dirty="0" smtClean="0"/>
-              <a:t>-4 Detail post</a:t>
+              <a:t>-2-4 Detail post</a:t>
             </a:r>
             <a:endParaRPr kumimoji="1" lang="ja-JP" altLang="en-US" dirty="0"/>
           </a:p>
@@ -9709,18 +9640,7 @@
                   </a:schemeClr>
                 </a:solidFill>
               </a:rPr>
-              <a:t>Main </a:t>
-            </a:r>
-            <a:r>
-              <a:rPr kumimoji="1" lang="en-US" altLang="ja-JP" sz="1050" dirty="0" smtClean="0">
-                <a:solidFill>
-                  <a:schemeClr val="tx2">
-                    <a:lumMod val="20000"/>
-                    <a:lumOff val="80000"/>
-                  </a:schemeClr>
-                </a:solidFill>
-              </a:rPr>
-              <a:t>page </a:t>
+              <a:t>Main page </a:t>
             </a:r>
             <a:r>
               <a:rPr kumimoji="1" lang="en-US" altLang="ja-JP" sz="1050" dirty="0"/>
@@ -10936,19 +10856,11 @@
             <a:pPr algn="r"/>
             <a:r>
               <a:rPr kumimoji="1" lang="en-US" altLang="ja-JP" sz="1000" dirty="0"/>
-              <a:t>  </a:t>
-            </a:r>
-            <a:r>
-              <a:rPr kumimoji="1" lang="en-US" altLang="ja-JP" sz="1000" dirty="0"/>
-              <a:t>Main Page| My Blog | New Post </a:t>
+              <a:t>  Main Page| My Blog | New Post </a:t>
             </a:r>
             <a:r>
               <a:rPr kumimoji="1" lang="en-US" altLang="ja-JP" sz="1000" dirty="0" smtClean="0"/>
-              <a:t>   			    Uay </a:t>
-            </a:r>
-            <a:r>
-              <a:rPr kumimoji="1" lang="en-US" altLang="ja-JP" sz="1000" dirty="0" smtClean="0"/>
-              <a:t>Le U| Logout</a:t>
+              <a:t>   			    Uay Le U| Logout</a:t>
             </a:r>
             <a:endParaRPr kumimoji="1" lang="ja-JP" altLang="en-US" sz="1000" dirty="0">
               <a:solidFill>
@@ -11743,11 +11655,7 @@
             </a:r>
             <a:r>
               <a:rPr kumimoji="1" lang="en-US" altLang="ja-JP" dirty="0" smtClean="0"/>
-              <a:t>-2</a:t>
-            </a:r>
-            <a:r>
-              <a:rPr kumimoji="1" lang="en-US" altLang="ja-JP" dirty="0" smtClean="0"/>
-              <a:t>-4-</a:t>
+              <a:t>-2-4-</a:t>
             </a:r>
             <a:r>
               <a:rPr kumimoji="1" lang="en-US" altLang="ja-JP" dirty="0"/>
@@ -11998,7 +11906,11 @@
                   </a:schemeClr>
                 </a:solidFill>
               </a:rPr>
-              <a:t>Main </a:t>
+              <a:t>Main page </a:t>
+            </a:r>
+            <a:r>
+              <a:rPr kumimoji="1" lang="en-US" altLang="ja-JP" sz="1050" dirty="0"/>
+              <a:t>&gt; </a:t>
             </a:r>
             <a:r>
               <a:rPr kumimoji="1" lang="en-US" altLang="ja-JP" sz="1050" dirty="0" smtClean="0">
@@ -12009,7 +11921,7 @@
                   </a:schemeClr>
                 </a:solidFill>
               </a:rPr>
-              <a:t>page </a:t>
+              <a:t>Detail post </a:t>
             </a:r>
             <a:r>
               <a:rPr kumimoji="1" lang="en-US" altLang="ja-JP" sz="1050" dirty="0"/>
@@ -12024,44 +11936,7 @@
                   </a:schemeClr>
                 </a:solidFill>
               </a:rPr>
-              <a:t>Detail post</a:t>
-            </a:r>
-            <a:r>
-              <a:rPr kumimoji="1" lang="en-US" altLang="ja-JP" sz="1050" dirty="0" smtClean="0">
-                <a:solidFill>
-                  <a:schemeClr val="tx2">
-                    <a:lumMod val="20000"/>
-                    <a:lumOff val="80000"/>
-                  </a:schemeClr>
-                </a:solidFill>
-              </a:rPr>
-              <a:t> </a:t>
-            </a:r>
-            <a:r>
-              <a:rPr kumimoji="1" lang="en-US" altLang="ja-JP" sz="1050" dirty="0"/>
-              <a:t>&gt; </a:t>
-            </a:r>
-            <a:r>
-              <a:rPr kumimoji="1" lang="en-US" altLang="ja-JP" sz="1050" dirty="0" smtClean="0">
-                <a:solidFill>
-                  <a:schemeClr val="tx2">
-                    <a:lumMod val="20000"/>
-                    <a:lumOff val="80000"/>
-                  </a:schemeClr>
-                </a:solidFill>
-              </a:rPr>
-              <a:t>Edit </a:t>
-            </a:r>
-            <a:r>
-              <a:rPr kumimoji="1" lang="en-US" altLang="ja-JP" sz="1050" dirty="0" smtClean="0">
-                <a:solidFill>
-                  <a:schemeClr val="tx2">
-                    <a:lumMod val="20000"/>
-                    <a:lumOff val="80000"/>
-                  </a:schemeClr>
-                </a:solidFill>
-              </a:rPr>
-              <a:t>post</a:t>
+              <a:t>Edit post</a:t>
             </a:r>
             <a:endParaRPr kumimoji="1" lang="ja-JP" altLang="en-US" sz="1050" dirty="0"/>
           </a:p>
@@ -13449,11 +13324,7 @@
             </a:r>
             <a:r>
               <a:rPr kumimoji="1" lang="en-US" altLang="ja-JP" sz="1000" dirty="0" smtClean="0"/>
-              <a:t>                                      </a:t>
-            </a:r>
-            <a:r>
-              <a:rPr kumimoji="1" lang="en-US" altLang="ja-JP" sz="1000" dirty="0" smtClean="0"/>
-              <a:t>Uay Le U| Logout</a:t>
+              <a:t>                                      Uay Le U| Logout</a:t>
             </a:r>
             <a:endParaRPr kumimoji="1" lang="ja-JP" altLang="en-US" sz="1000" dirty="0">
               <a:solidFill>
@@ -13775,15 +13646,7 @@
                   <a:srgbClr val="FF0000"/>
                 </a:solidFill>
               </a:rPr>
-              <a:t>(</a:t>
-            </a:r>
-            <a:r>
-              <a:rPr kumimoji="1" lang="en-US" altLang="ja-JP" sz="1000" dirty="0" smtClean="0">
-                <a:solidFill>
-                  <a:srgbClr val="FF0000"/>
-                </a:solidFill>
-              </a:rPr>
-              <a:t>12)</a:t>
+              <a:t>(12)</a:t>
             </a:r>
             <a:endParaRPr kumimoji="1" lang="ja-JP" altLang="en-US" sz="1000" dirty="0">
               <a:solidFill>
@@ -14231,15 +14094,7 @@
                   <a:srgbClr val="FF0000"/>
                 </a:solidFill>
               </a:rPr>
-              <a:t>(</a:t>
-            </a:r>
-            <a:r>
-              <a:rPr kumimoji="1" lang="en-US" altLang="ja-JP" sz="1000" dirty="0" smtClean="0">
-                <a:solidFill>
-                  <a:srgbClr val="FF0000"/>
-                </a:solidFill>
-              </a:rPr>
-              <a:t>13)</a:t>
+              <a:t>(13)</a:t>
             </a:r>
             <a:endParaRPr kumimoji="1" lang="ja-JP" altLang="en-US" sz="1000" dirty="0">
               <a:solidFill>
@@ -14337,19 +14192,7 @@
             </a:r>
             <a:r>
               <a:rPr kumimoji="1" lang="en-US" altLang="ja-JP" dirty="0" smtClean="0"/>
-              <a:t>-2</a:t>
-            </a:r>
-            <a:r>
-              <a:rPr kumimoji="1" lang="en-US" altLang="ja-JP" dirty="0" smtClean="0"/>
-              <a:t>-4-</a:t>
-            </a:r>
-            <a:r>
-              <a:rPr kumimoji="1" lang="en-US" altLang="ja-JP" dirty="0" smtClean="0"/>
-              <a:t>2</a:t>
-            </a:r>
-            <a:r>
-              <a:rPr kumimoji="1" lang="en-US" altLang="ja-JP" dirty="0" smtClean="0"/>
-              <a:t> Edit comment</a:t>
+              <a:t>-2-4-2 Edit comment</a:t>
             </a:r>
             <a:endParaRPr kumimoji="1" lang="ja-JP" altLang="en-US" dirty="0"/>
           </a:p>
@@ -14592,7 +14435,11 @@
                   </a:schemeClr>
                 </a:solidFill>
               </a:rPr>
-              <a:t>Main </a:t>
+              <a:t>Main page </a:t>
+            </a:r>
+            <a:r>
+              <a:rPr kumimoji="1" lang="en-US" altLang="ja-JP" sz="1050" dirty="0"/>
+              <a:t>&gt; </a:t>
             </a:r>
             <a:r>
               <a:rPr kumimoji="1" lang="en-US" altLang="ja-JP" sz="1050" dirty="0" smtClean="0">
@@ -14603,7 +14450,7 @@
                   </a:schemeClr>
                 </a:solidFill>
               </a:rPr>
-              <a:t>page </a:t>
+              <a:t>Detail post </a:t>
             </a:r>
             <a:r>
               <a:rPr kumimoji="1" lang="en-US" altLang="ja-JP" sz="1050" dirty="0"/>
@@ -14618,44 +14465,7 @@
                   </a:schemeClr>
                 </a:solidFill>
               </a:rPr>
-              <a:t>Detail post</a:t>
-            </a:r>
-            <a:r>
-              <a:rPr kumimoji="1" lang="en-US" altLang="ja-JP" sz="1050" dirty="0" smtClean="0">
-                <a:solidFill>
-                  <a:schemeClr val="tx2">
-                    <a:lumMod val="20000"/>
-                    <a:lumOff val="80000"/>
-                  </a:schemeClr>
-                </a:solidFill>
-              </a:rPr>
-              <a:t> </a:t>
-            </a:r>
-            <a:r>
-              <a:rPr kumimoji="1" lang="en-US" altLang="ja-JP" sz="1050" dirty="0"/>
-              <a:t>&gt; </a:t>
-            </a:r>
-            <a:r>
-              <a:rPr kumimoji="1" lang="en-US" altLang="ja-JP" sz="1050" dirty="0" smtClean="0">
-                <a:solidFill>
-                  <a:schemeClr val="tx2">
-                    <a:lumMod val="20000"/>
-                    <a:lumOff val="80000"/>
-                  </a:schemeClr>
-                </a:solidFill>
-              </a:rPr>
-              <a:t>Edit </a:t>
-            </a:r>
-            <a:r>
-              <a:rPr kumimoji="1" lang="en-US" altLang="ja-JP" sz="1050" dirty="0" smtClean="0">
-                <a:solidFill>
-                  <a:schemeClr val="tx2">
-                    <a:lumMod val="20000"/>
-                    <a:lumOff val="80000"/>
-                  </a:schemeClr>
-                </a:solidFill>
-              </a:rPr>
-              <a:t>post</a:t>
+              <a:t>Edit post</a:t>
             </a:r>
             <a:endParaRPr kumimoji="1" lang="ja-JP" altLang="en-US" sz="1050" dirty="0"/>
           </a:p>
@@ -15971,19 +15781,11 @@
             <a:pPr algn="r"/>
             <a:r>
               <a:rPr kumimoji="1" lang="en-US" altLang="ja-JP" sz="1000" dirty="0"/>
-              <a:t>  </a:t>
-            </a:r>
-            <a:r>
-              <a:rPr kumimoji="1" lang="en-US" altLang="ja-JP" sz="1000" dirty="0"/>
-              <a:t>Main Page| My Blog | New Post </a:t>
+              <a:t>  Main Page| My Blog | New Post </a:t>
             </a:r>
             <a:r>
               <a:rPr kumimoji="1" lang="en-US" altLang="ja-JP" sz="1000" dirty="0" smtClean="0"/>
-              <a:t>     	         	     Uay </a:t>
-            </a:r>
-            <a:r>
-              <a:rPr kumimoji="1" lang="en-US" altLang="ja-JP" sz="1000" dirty="0" smtClean="0"/>
-              <a:t>Le U| Logout</a:t>
+              <a:t>     	         	     Uay Le U| Logout</a:t>
             </a:r>
             <a:endParaRPr kumimoji="1" lang="ja-JP" altLang="en-US" sz="1000" dirty="0">
               <a:solidFill>
@@ -16267,15 +16069,7 @@
                   <a:srgbClr val="FF0000"/>
                 </a:solidFill>
               </a:rPr>
-              <a:t>(</a:t>
-            </a:r>
-            <a:r>
-              <a:rPr kumimoji="1" lang="en-US" altLang="ja-JP" sz="1000" dirty="0" smtClean="0">
-                <a:solidFill>
-                  <a:srgbClr val="FF0000"/>
-                </a:solidFill>
-              </a:rPr>
-              <a:t>11)</a:t>
+              <a:t>(11)</a:t>
             </a:r>
             <a:endParaRPr kumimoji="1" lang="ja-JP" altLang="en-US" sz="1000" dirty="0">
               <a:solidFill>
@@ -16351,15 +16145,7 @@
                   <a:srgbClr val="FF0000"/>
                 </a:solidFill>
               </a:rPr>
-              <a:t>(</a:t>
-            </a:r>
-            <a:r>
-              <a:rPr kumimoji="1" lang="en-US" altLang="ja-JP" sz="1000" dirty="0" smtClean="0">
-                <a:solidFill>
-                  <a:srgbClr val="FF0000"/>
-                </a:solidFill>
-              </a:rPr>
-              <a:t>10)</a:t>
+              <a:t>(10)</a:t>
             </a:r>
             <a:endParaRPr kumimoji="1" lang="ja-JP" altLang="en-US" sz="1000" dirty="0">
               <a:solidFill>
@@ -16566,15 +16352,7 @@
                   <a:srgbClr val="FF0000"/>
                 </a:solidFill>
               </a:rPr>
-              <a:t>(</a:t>
-            </a:r>
-            <a:r>
-              <a:rPr kumimoji="1" lang="en-US" altLang="ja-JP" sz="1000" dirty="0" smtClean="0">
-                <a:solidFill>
-                  <a:srgbClr val="FF0000"/>
-                </a:solidFill>
-              </a:rPr>
-              <a:t>12)</a:t>
+              <a:t>(12)</a:t>
             </a:r>
             <a:endParaRPr kumimoji="1" lang="ja-JP" altLang="en-US" sz="1000" dirty="0">
               <a:solidFill>
@@ -16672,11 +16450,7 @@
             </a:r>
             <a:r>
               <a:rPr kumimoji="1" lang="en-US" altLang="ja-JP" dirty="0" smtClean="0"/>
-              <a:t>-2</a:t>
-            </a:r>
-            <a:r>
-              <a:rPr kumimoji="1" lang="en-US" altLang="ja-JP" dirty="0" smtClean="0"/>
-              <a:t>-5 Add post</a:t>
+              <a:t>-2-5 Add post</a:t>
             </a:r>
             <a:endParaRPr kumimoji="1" lang="ja-JP" altLang="en-US" dirty="0"/>
           </a:p>
@@ -16919,18 +16693,7 @@
                   </a:schemeClr>
                 </a:solidFill>
               </a:rPr>
-              <a:t>Main </a:t>
-            </a:r>
-            <a:r>
-              <a:rPr kumimoji="1" lang="en-US" altLang="ja-JP" sz="1050" dirty="0" smtClean="0">
-                <a:solidFill>
-                  <a:schemeClr val="tx2">
-                    <a:lumMod val="20000"/>
-                    <a:lumOff val="80000"/>
-                  </a:schemeClr>
-                </a:solidFill>
-              </a:rPr>
-              <a:t>page </a:t>
+              <a:t>Main page </a:t>
             </a:r>
             <a:r>
               <a:rPr kumimoji="1" lang="en-US" altLang="ja-JP" sz="1050" dirty="0"/>
@@ -18329,19 +18092,11 @@
             <a:pPr algn="r"/>
             <a:r>
               <a:rPr kumimoji="1" lang="en-US" altLang="ja-JP" sz="1000" dirty="0"/>
-              <a:t>  </a:t>
-            </a:r>
-            <a:r>
-              <a:rPr kumimoji="1" lang="en-US" altLang="ja-JP" sz="1000" dirty="0"/>
-              <a:t>Main Page| My Blog | New Post </a:t>
+              <a:t>  Main Page| My Blog | New Post </a:t>
             </a:r>
             <a:r>
               <a:rPr kumimoji="1" lang="en-US" altLang="ja-JP" sz="1000" dirty="0" smtClean="0"/>
-              <a:t>			     Uay </a:t>
-            </a:r>
-            <a:r>
-              <a:rPr kumimoji="1" lang="en-US" altLang="ja-JP" sz="1000" dirty="0" smtClean="0"/>
-              <a:t>Le U| Logout</a:t>
+              <a:t>			     Uay Le U| Logout</a:t>
             </a:r>
             <a:endParaRPr kumimoji="1" lang="ja-JP" altLang="en-US" sz="1000" dirty="0">
               <a:solidFill>
@@ -18625,15 +18380,7 @@
                   <a:srgbClr val="FF0000"/>
                 </a:solidFill>
               </a:rPr>
-              <a:t>(</a:t>
-            </a:r>
-            <a:r>
-              <a:rPr kumimoji="1" lang="en-US" altLang="ja-JP" sz="1000" dirty="0" smtClean="0">
-                <a:solidFill>
-                  <a:srgbClr val="FF0000"/>
-                </a:solidFill>
-              </a:rPr>
-              <a:t>12)</a:t>
+              <a:t>(12)</a:t>
             </a:r>
             <a:endParaRPr kumimoji="1" lang="ja-JP" altLang="en-US" sz="1000" dirty="0">
               <a:solidFill>
@@ -19081,15 +18828,7 @@
                   <a:srgbClr val="FF0000"/>
                 </a:solidFill>
               </a:rPr>
-              <a:t>(</a:t>
-            </a:r>
-            <a:r>
-              <a:rPr kumimoji="1" lang="en-US" altLang="ja-JP" sz="1000" dirty="0" smtClean="0">
-                <a:solidFill>
-                  <a:srgbClr val="FF0000"/>
-                </a:solidFill>
-              </a:rPr>
-              <a:t>13)</a:t>
+              <a:t>(13)</a:t>
             </a:r>
             <a:endParaRPr kumimoji="1" lang="ja-JP" altLang="en-US" sz="1000" dirty="0">
               <a:solidFill>
@@ -21187,11 +20926,7 @@
                     <a:p>
                       <a:r>
                         <a:rPr kumimoji="1" lang="en-US" altLang="ja-JP" sz="1000" dirty="0" smtClean="0"/>
-                        <a:t>Button </a:t>
-                      </a:r>
-                      <a:r>
-                        <a:rPr kumimoji="1" lang="en-US" altLang="ja-JP" sz="1000" dirty="0" smtClean="0"/>
-                        <a:t>for submit</a:t>
+                        <a:t>Button for submit</a:t>
                       </a:r>
                       <a:r>
                         <a:rPr kumimoji="1" lang="en-US" altLang="ja-JP" sz="1000" baseline="0" dirty="0" smtClean="0"/>
@@ -27043,15 +26778,7 @@
             </a:r>
             <a:r>
               <a:rPr kumimoji="1" lang="en-US" altLang="ja-JP" sz="1000" dirty="0" smtClean="0"/>
-              <a:t>Main Page| My Blog | New Post                                        </a:t>
-            </a:r>
-            <a:r>
-              <a:rPr kumimoji="1" lang="en-US" altLang="ja-JP" sz="1000" dirty="0" smtClean="0"/>
-              <a:t>Uay </a:t>
-            </a:r>
-            <a:r>
-              <a:rPr kumimoji="1" lang="en-US" altLang="ja-JP" sz="1000" dirty="0" smtClean="0"/>
-              <a:t>Le U| Logout</a:t>
+              <a:t>Main Page| My Blog | New Post                                        Uay Le U| Logout</a:t>
             </a:r>
             <a:endParaRPr kumimoji="1" lang="ja-JP" altLang="en-US" sz="1000" dirty="0">
               <a:solidFill>
@@ -28033,18 +27760,7 @@
                   </a:schemeClr>
                 </a:solidFill>
               </a:rPr>
-              <a:t>Main </a:t>
-            </a:r>
-            <a:r>
-              <a:rPr kumimoji="1" lang="en-US" altLang="ja-JP" sz="1050" dirty="0" smtClean="0">
-                <a:solidFill>
-                  <a:schemeClr val="tx2">
-                    <a:lumMod val="20000"/>
-                    <a:lumOff val="80000"/>
-                  </a:schemeClr>
-                </a:solidFill>
-              </a:rPr>
-              <a:t>page </a:t>
+              <a:t>Main page </a:t>
             </a:r>
             <a:r>
               <a:rPr kumimoji="1" lang="en-US" altLang="ja-JP" sz="1050" dirty="0"/>
@@ -29179,11 +28895,7 @@
             </a:r>
             <a:r>
               <a:rPr kumimoji="1" lang="en-US" altLang="ja-JP" sz="1000" dirty="0" smtClean="0"/>
-              <a:t>      </a:t>
-            </a:r>
-            <a:r>
-              <a:rPr kumimoji="1" lang="en-US" altLang="ja-JP" sz="1000" dirty="0" smtClean="0"/>
-              <a:t>Main </a:t>
+              <a:t>      Main </a:t>
             </a:r>
             <a:r>
               <a:rPr kumimoji="1" lang="en-US" altLang="ja-JP" sz="1000" dirty="0"/>
@@ -29191,11 +28903,7 @@
             </a:r>
             <a:r>
               <a:rPr kumimoji="1" lang="en-US" altLang="ja-JP" sz="1000" dirty="0" smtClean="0"/>
-              <a:t>                                        Uay </a:t>
-            </a:r>
-            <a:r>
-              <a:rPr kumimoji="1" lang="en-US" altLang="ja-JP" sz="1000" dirty="0" smtClean="0"/>
-              <a:t>Le U| Logout</a:t>
+              <a:t>                                        Uay Le U| Logout</a:t>
             </a:r>
             <a:endParaRPr kumimoji="1" lang="ja-JP" altLang="en-US" sz="1000" dirty="0">
               <a:solidFill>
@@ -31646,19 +31354,11 @@
             <a:pPr algn="r"/>
             <a:r>
               <a:rPr kumimoji="1" lang="en-US" altLang="ja-JP" sz="1000" dirty="0"/>
-              <a:t>  </a:t>
-            </a:r>
-            <a:r>
-              <a:rPr kumimoji="1" lang="en-US" altLang="ja-JP" sz="1000" dirty="0"/>
-              <a:t>Main Page| My Blog | New Post </a:t>
+              <a:t>  Main Page| My Blog | New Post </a:t>
             </a:r>
             <a:r>
               <a:rPr kumimoji="1" lang="en-US" altLang="ja-JP" sz="1000" dirty="0" smtClean="0"/>
-              <a:t>                                       Uay </a:t>
-            </a:r>
-            <a:r>
-              <a:rPr kumimoji="1" lang="en-US" altLang="ja-JP" sz="1000" dirty="0" smtClean="0"/>
-              <a:t>Le U| Logout</a:t>
+              <a:t>                                       Uay Le U| Logout</a:t>
             </a:r>
             <a:endParaRPr kumimoji="1" lang="ja-JP" altLang="en-US" sz="1000" dirty="0">
               <a:solidFill>
@@ -33027,7 +32727,7 @@
         <p:spPr>
           <a:xfrm>
             <a:off x="384739" y="1668018"/>
-            <a:ext cx="2462051" cy="253916"/>
+            <a:ext cx="2826559" cy="253916"/>
           </a:xfrm>
           <a:prstGeom prst="rect">
             <a:avLst/>
@@ -33068,7 +32768,11 @@
                   </a:schemeClr>
                 </a:solidFill>
               </a:rPr>
-              <a:t>Main </a:t>
+              <a:t>Main page </a:t>
+            </a:r>
+            <a:r>
+              <a:rPr kumimoji="1" lang="en-US" altLang="ja-JP" sz="1050" dirty="0"/>
+              <a:t>&gt; </a:t>
             </a:r>
             <a:r>
               <a:rPr kumimoji="1" lang="en-US" altLang="ja-JP" sz="1050" dirty="0" smtClean="0">
@@ -33079,7 +32783,7 @@
                   </a:schemeClr>
                 </a:solidFill>
               </a:rPr>
-              <a:t>page </a:t>
+              <a:t>Profile </a:t>
             </a:r>
             <a:r>
               <a:rPr kumimoji="1" lang="en-US" altLang="ja-JP" sz="1050" dirty="0"/>
@@ -33094,22 +32798,7 @@
                   </a:schemeClr>
                 </a:solidFill>
               </a:rPr>
-              <a:t>Profile </a:t>
-            </a:r>
-            <a:r>
-              <a:rPr kumimoji="1" lang="en-US" altLang="ja-JP" sz="1050" dirty="0"/>
-              <a:t>&gt; </a:t>
-            </a:r>
-            <a:r>
-              <a:rPr kumimoji="1" lang="en-US" altLang="ja-JP" sz="1050" dirty="0" smtClean="0">
-                <a:solidFill>
-                  <a:schemeClr val="tx2">
-                    <a:lumMod val="20000"/>
-                    <a:lumOff val="80000"/>
-                  </a:schemeClr>
-                </a:solidFill>
-              </a:rPr>
-              <a:t>Edit profile</a:t>
+              <a:t>Change password</a:t>
             </a:r>
             <a:endParaRPr kumimoji="1" lang="ja-JP" altLang="en-US" sz="1050" dirty="0"/>
           </a:p>
@@ -34561,19 +34250,11 @@
             <a:pPr algn="r"/>
             <a:r>
               <a:rPr kumimoji="1" lang="en-US" altLang="ja-JP" sz="1000" dirty="0"/>
-              <a:t>  </a:t>
-            </a:r>
-            <a:r>
-              <a:rPr kumimoji="1" lang="en-US" altLang="ja-JP" sz="1000" dirty="0"/>
-              <a:t>Main Page| My Blog | New Post </a:t>
+              <a:t>  Main Page| My Blog | New Post </a:t>
             </a:r>
             <a:r>
               <a:rPr kumimoji="1" lang="en-US" altLang="ja-JP" sz="1000" dirty="0" smtClean="0"/>
-              <a:t>			     Uay </a:t>
-            </a:r>
-            <a:r>
-              <a:rPr kumimoji="1" lang="en-US" altLang="ja-JP" sz="1000" dirty="0" smtClean="0"/>
-              <a:t>Le U| Logout</a:t>
+              <a:t>			     Uay Le U| Logout</a:t>
             </a:r>
             <a:endParaRPr kumimoji="1" lang="ja-JP" altLang="en-US" sz="1000" dirty="0">
               <a:solidFill>
@@ -37705,19 +37386,11 @@
             <a:pPr algn="r"/>
             <a:r>
               <a:rPr kumimoji="1" lang="en-US" altLang="ja-JP" sz="1000" dirty="0"/>
-              <a:t> </a:t>
-            </a:r>
-            <a:r>
-              <a:rPr kumimoji="1" lang="en-US" altLang="ja-JP" sz="1000" dirty="0"/>
-              <a:t>Main Page| My Blog | New Post </a:t>
+              <a:t> Main Page| My Blog | New Post </a:t>
             </a:r>
             <a:r>
               <a:rPr kumimoji="1" lang="en-US" altLang="ja-JP" sz="1000" dirty="0" smtClean="0"/>
-              <a:t>   			   </a:t>
-            </a:r>
-            <a:r>
-              <a:rPr kumimoji="1" lang="en-US" altLang="ja-JP" sz="1000" dirty="0" smtClean="0"/>
-              <a:t>Uay Le U| Logout</a:t>
+              <a:t>   			   Uay Le U| Logout</a:t>
             </a:r>
             <a:endParaRPr kumimoji="1" lang="ja-JP" altLang="en-US" sz="1000" dirty="0">
               <a:solidFill>

</xml_diff>